<commit_message>
Updated PPT for the presentation
</commit_message>
<xml_diff>
--- a/ElderlyHealthCareAI.pptx
+++ b/ElderlyHealthCareAI.pptx
@@ -218,7 +218,7 @@
           <a:p>
             <a:fld id="{E8C652EB-1AD3-475A-A521-A73369DAF7B8}" type="datetimeFigureOut">
               <a:rPr lang="en-US" smtClean="0"/>
-              <a:t>3/16/2025</a:t>
+              <a:t>4/9/2025</a:t>
             </a:fld>
             <a:endParaRPr lang="en-US"/>
           </a:p>
@@ -8079,6 +8079,53 @@
               <a:ea typeface="+mn-ea"/>
               <a:cs typeface="+mn-cs"/>
             </a:endParaRPr>
+          </a:p>
+        </p:txBody>
+      </p:sp>
+      <p:sp>
+        <p:nvSpPr>
+          <p:cNvPr id="3" name="TextBox 2">
+            <a:extLst>
+              <a:ext uri="{FF2B5EF4-FFF2-40B4-BE49-F238E27FC236}">
+                <a16:creationId xmlns:a16="http://schemas.microsoft.com/office/drawing/2014/main" id="{DE147008-8531-599E-BA09-795AD895F394}"/>
+              </a:ext>
+            </a:extLst>
+          </p:cNvPr>
+          <p:cNvSpPr txBox="1"/>
+          <p:nvPr userDrawn="1">
+            <p:extLst>
+              <p:ext uri="{1162E1C5-73C7-4A58-AE30-91384D911F3F}">
+                <p184:classification xmlns:p184="http://schemas.microsoft.com/office/powerpoint/2018/4/main" val="ftr"/>
+              </p:ext>
+            </p:extLst>
+          </p:nvPr>
+        </p:nvSpPr>
+        <p:spPr>
+          <a:xfrm>
+            <a:off x="5925312" y="6672580"/>
+            <a:ext cx="369888" cy="121920"/>
+          </a:xfrm>
+          <a:prstGeom prst="rect">
+            <a:avLst/>
+          </a:prstGeom>
+        </p:spPr>
+        <p:txBody>
+          <a:bodyPr horzOverflow="overflow" lIns="0" tIns="0" rIns="0" bIns="0">
+            <a:spAutoFit/>
+          </a:bodyPr>
+          <a:lstStyle/>
+          <a:p>
+            <a:pPr algn="l"/>
+            <a:r>
+              <a:rPr lang="en-US" sz="800">
+                <a:solidFill>
+                  <a:srgbClr val="000000"/>
+                </a:solidFill>
+                <a:latin typeface="Arial" panose="020B0604020202020204" pitchFamily="34" charset="0"/>
+                <a:cs typeface="Arial" panose="020B0604020202020204" pitchFamily="34" charset="0"/>
+              </a:rPr>
+              <a:t>Internal</a:t>
+            </a:r>
           </a:p>
         </p:txBody>
       </p:sp>
@@ -8949,6 +8996,53 @@
               <a:t>‹#›</a:t>
             </a:fld>
             <a:endParaRPr lang="en-GB"/>
+          </a:p>
+        </p:txBody>
+      </p:sp>
+      <p:sp>
+        <p:nvSpPr>
+          <p:cNvPr id="3" name="TextBox 2">
+            <a:extLst>
+              <a:ext uri="{FF2B5EF4-FFF2-40B4-BE49-F238E27FC236}">
+                <a16:creationId xmlns:a16="http://schemas.microsoft.com/office/drawing/2014/main" id="{BDC36160-AD1E-43E9-EB10-6561FFBFE846}"/>
+              </a:ext>
+            </a:extLst>
+          </p:cNvPr>
+          <p:cNvSpPr txBox="1"/>
+          <p:nvPr userDrawn="1">
+            <p:extLst>
+              <p:ext uri="{1162E1C5-73C7-4A58-AE30-91384D911F3F}">
+                <p184:classification xmlns:p184="http://schemas.microsoft.com/office/powerpoint/2018/4/main" val="ftr"/>
+              </p:ext>
+            </p:extLst>
+          </p:nvPr>
+        </p:nvSpPr>
+        <p:spPr>
+          <a:xfrm>
+            <a:off x="5925312" y="6672580"/>
+            <a:ext cx="369888" cy="121920"/>
+          </a:xfrm>
+          <a:prstGeom prst="rect">
+            <a:avLst/>
+          </a:prstGeom>
+        </p:spPr>
+        <p:txBody>
+          <a:bodyPr horzOverflow="overflow" lIns="0" tIns="0" rIns="0" bIns="0">
+            <a:spAutoFit/>
+          </a:bodyPr>
+          <a:lstStyle/>
+          <a:p>
+            <a:pPr algn="l"/>
+            <a:r>
+              <a:rPr lang="en-US" sz="800">
+                <a:solidFill>
+                  <a:srgbClr val="000000"/>
+                </a:solidFill>
+                <a:latin typeface="Arial" panose="020B0604020202020204" pitchFamily="34" charset="0"/>
+                <a:cs typeface="Arial" panose="020B0604020202020204" pitchFamily="34" charset="0"/>
+              </a:rPr>
+              <a:t>Internal</a:t>
+            </a:r>
           </a:p>
         </p:txBody>
       </p:sp>
@@ -11354,22 +11448,25 @@
               <a:defRPr/>
             </a:pPr>
             <a:r>
-              <a:rPr kumimoji="0" lang="en-GB" sz="2000" b="1" i="0" u="none" strike="noStrike" kern="1200" cap="none" spc="0" normalizeH="0" baseline="0" noProof="0" dirty="0">
-                <a:ln>
-                  <a:noFill/>
-                </a:ln>
-                <a:solidFill>
-                  <a:srgbClr val="A100FF"/>
-                </a:solidFill>
-                <a:effectLst/>
-                <a:uLnTx/>
-                <a:uFillTx/>
+              <a:rPr lang="en-GB" sz="2000" dirty="0">
                 <a:latin typeface="Graphik"/>
-                <a:ea typeface="+mn-ea"/>
-                <a:cs typeface="+mn-cs"/>
               </a:rPr>
-              <a:t>Name (Team Leader)</a:t>
+              <a:t>Mukul Agarwal	</a:t>
             </a:r>
+            <a:endParaRPr kumimoji="0" lang="en-GB" sz="2000" b="1" i="0" u="none" strike="noStrike" kern="1200" cap="none" spc="0" normalizeH="0" baseline="0" noProof="0" dirty="0">
+              <a:ln>
+                <a:noFill/>
+              </a:ln>
+              <a:solidFill>
+                <a:srgbClr val="A100FF"/>
+              </a:solidFill>
+              <a:effectLst/>
+              <a:uLnTx/>
+              <a:uFillTx/>
+              <a:latin typeface="Graphik"/>
+              <a:ea typeface="+mn-ea"/>
+              <a:cs typeface="+mn-cs"/>
+            </a:endParaRPr>
           </a:p>
         </p:txBody>
       </p:sp>
@@ -11780,7 +11877,7 @@
                 <a:ea typeface="+mn-ea"/>
                 <a:cs typeface="+mn-cs"/>
               </a:rPr>
-              <a:t>Name </a:t>
+              <a:t>Ayush Agrawal </a:t>
             </a:r>
           </a:p>
         </p:txBody>
@@ -12067,7 +12164,7 @@
           <p:nvPr>
             <p:extLst>
               <p:ext uri="{D42A27DB-BD31-4B8C-83A1-F6EECF244321}">
-                <p14:modId xmlns:p14="http://schemas.microsoft.com/office/powerpoint/2010/main" val="470395431"/>
+                <p14:modId xmlns:p14="http://schemas.microsoft.com/office/powerpoint/2010/main" val="823669045"/>
               </p:ext>
             </p:extLst>
           </p:nvPr>
@@ -12110,7 +12207,7 @@
                             <a:srgbClr val="A100FF"/>
                           </a:solidFill>
                         </a:rPr>
-                        <a:t>TEAM NAME:</a:t>
+                        <a:t>TEAM NAME: Companion AI</a:t>
                       </a:r>
                     </a:p>
                   </a:txBody>
@@ -12721,14 +12818,14 @@
           <p:nvPr>
             <p:extLst>
               <p:ext uri="{D42A27DB-BD31-4B8C-83A1-F6EECF244321}">
-                <p14:modId xmlns:p14="http://schemas.microsoft.com/office/powerpoint/2010/main" val="3131405845"/>
+                <p14:modId xmlns:p14="http://schemas.microsoft.com/office/powerpoint/2010/main" val="1599814663"/>
               </p:ext>
             </p:extLst>
           </p:nvPr>
         </p:nvGraphicFramePr>
         <p:xfrm>
-          <a:off x="323868" y="990600"/>
-          <a:ext cx="11544264" cy="5267325"/>
+          <a:off x="323868" y="1331144"/>
+          <a:ext cx="11544264" cy="5433239"/>
         </p:xfrm>
         <a:graphic>
           <a:graphicData uri="http://schemas.openxmlformats.org/drawingml/2006/table">
@@ -12752,7 +12849,7 @@
                   </a:extLst>
                 </a:gridCol>
               </a:tblGrid>
-              <a:tr h="828675">
+              <a:tr h="361215">
                 <a:tc>
                   <a:txBody>
                     <a:bodyPr/>
@@ -12764,24 +12861,6 @@
                           <a:latin typeface="Graphik" panose="020B0503030202060203" pitchFamily="34" charset="0"/>
                         </a:rPr>
                         <a:t>Idea Title</a:t>
-                      </a:r>
-                      <a:br>
-                        <a:rPr lang="en-US" dirty="0">
-                          <a:latin typeface="Graphik" panose="020B0503030202060203" pitchFamily="34" charset="0"/>
-                        </a:rPr>
-                      </a:br>
-                      <a:r>
-                        <a:rPr lang="en-US" sz="1400" b="0" i="0" u="none" strike="noStrike" cap="none" dirty="0">
-                          <a:solidFill>
-                            <a:schemeClr val="dk1"/>
-                          </a:solidFill>
-                          <a:effectLst/>
-                          <a:latin typeface="Graphik" panose="020B0503030202060203" pitchFamily="34" charset="0"/>
-                          <a:ea typeface="+mn-ea"/>
-                          <a:cs typeface="+mn-cs"/>
-                          <a:sym typeface="Arial"/>
-                        </a:rPr>
-                        <a:t>(Provide a concise and impactful title for your idea.)</a:t>
                       </a:r>
                       <a:endParaRPr lang="en-US" dirty="0">
                         <a:latin typeface="Graphik" panose="020B0503030202060203" pitchFamily="34" charset="0"/>
@@ -12842,6 +12921,97 @@
                   <a:txBody>
                     <a:bodyPr/>
                     <a:lstStyle/>
+                    <a:p>
+                      <a:pPr marL="0" marR="0" lvl="0" indent="0" algn="l" defTabSz="914400" rtl="0" eaLnBrk="1" fontAlgn="auto" latinLnBrk="0" hangingPunct="1">
+                        <a:lnSpc>
+                          <a:spcPct val="100000"/>
+                        </a:lnSpc>
+                        <a:spcBef>
+                          <a:spcPts val="0"/>
+                        </a:spcBef>
+                        <a:spcAft>
+                          <a:spcPts val="0"/>
+                        </a:spcAft>
+                        <a:buClr>
+                          <a:srgbClr val="000000"/>
+                        </a:buClr>
+                        <a:buSzTx/>
+                        <a:buFont typeface="Arial"/>
+                        <a:buNone/>
+                        <a:tabLst/>
+                        <a:defRPr/>
+                      </a:pPr>
+                      <a:endParaRPr lang="en-US" sz="1867" b="0" i="0" u="none" strike="noStrike" cap="none" dirty="0">
+                        <a:solidFill>
+                          <a:schemeClr val="dk1"/>
+                        </a:solidFill>
+                        <a:effectLst/>
+                        <a:latin typeface="+mn-lt"/>
+                        <a:ea typeface="+mn-ea"/>
+                        <a:cs typeface="+mn-cs"/>
+                        <a:sym typeface="Arial"/>
+                      </a:endParaRPr>
+                    </a:p>
+                    <a:p>
+                      <a:pPr marL="0" marR="0" lvl="0" indent="0" algn="l" defTabSz="914400" rtl="0" eaLnBrk="1" fontAlgn="auto" latinLnBrk="0" hangingPunct="1">
+                        <a:lnSpc>
+                          <a:spcPct val="100000"/>
+                        </a:lnSpc>
+                        <a:spcBef>
+                          <a:spcPts val="0"/>
+                        </a:spcBef>
+                        <a:spcAft>
+                          <a:spcPts val="0"/>
+                        </a:spcAft>
+                        <a:buClr>
+                          <a:srgbClr val="000000"/>
+                        </a:buClr>
+                        <a:buSzTx/>
+                        <a:buFont typeface="Arial"/>
+                        <a:buNone/>
+                        <a:tabLst/>
+                        <a:defRPr/>
+                      </a:pPr>
+                      <a:r>
+                        <a:rPr lang="en-US" sz="1867" b="0" i="0" u="none" strike="noStrike" cap="none" dirty="0">
+                          <a:solidFill>
+                            <a:schemeClr val="dk1"/>
+                          </a:solidFill>
+                          <a:effectLst/>
+                          <a:latin typeface="+mn-lt"/>
+                          <a:ea typeface="+mn-ea"/>
+                          <a:cs typeface="+mn-cs"/>
+                          <a:sym typeface="Arial"/>
+                        </a:rPr>
+                        <a:t>Emp</a:t>
+                      </a:r>
+                      <a:r>
+                        <a:rPr lang="en-US" sz="1800" b="0" i="0" u="none" strike="noStrike" cap="none" dirty="0">
+                          <a:solidFill>
+                            <a:schemeClr val="dk1"/>
+                          </a:solidFill>
+                          <a:effectLst/>
+                          <a:latin typeface="+mn-lt"/>
+                          <a:ea typeface="+mn-ea"/>
+                          <a:cs typeface="+mn-cs"/>
+                          <a:sym typeface="Arial"/>
+                        </a:rPr>
+                        <a:t>owerin</a:t>
+                      </a:r>
+                      <a:r>
+                        <a:rPr lang="en-US" sz="1867" b="0" i="0" u="none" strike="noStrike" cap="none" dirty="0">
+                          <a:solidFill>
+                            <a:schemeClr val="dk1"/>
+                          </a:solidFill>
+                          <a:effectLst/>
+                          <a:latin typeface="+mn-lt"/>
+                          <a:ea typeface="+mn-ea"/>
+                          <a:cs typeface="+mn-cs"/>
+                          <a:sym typeface="Arial"/>
+                        </a:rPr>
+                        <a:t>g Elderly Care with Multi-Agent AI System</a:t>
+                      </a:r>
+                    </a:p>
                     <a:p>
                       <a:endParaRPr lang="en-US" dirty="0">
                         <a:latin typeface="Graphik" panose="020B0503030202060203" pitchFamily="34" charset="0"/>
@@ -12904,7 +13074,7 @@
                   </a:ext>
                 </a:extLst>
               </a:tr>
-              <a:tr h="816769">
+              <a:tr h="586468">
                 <a:tc>
                   <a:txBody>
                     <a:bodyPr/>
@@ -12971,9 +13141,24 @@
                     <a:bodyPr/>
                     <a:lstStyle/>
                     <a:p>
-                      <a:endParaRPr lang="en-US" dirty="0">
-                        <a:latin typeface="Graphik" panose="020B0503030202060203" pitchFamily="34" charset="0"/>
-                      </a:endParaRPr>
+                      <a:pPr>
+                        <a:lnSpc>
+                          <a:spcPct val="150000"/>
+                        </a:lnSpc>
+                      </a:pPr>
+                      <a:r>
+                        <a:rPr lang="en-US" sz="1867" b="0" i="0" u="none" strike="noStrike" cap="none" dirty="0">
+                          <a:solidFill>
+                            <a:schemeClr val="dk1"/>
+                          </a:solidFill>
+                          <a:effectLst/>
+                          <a:latin typeface="+mn-lt"/>
+                          <a:ea typeface="+mn-ea"/>
+                          <a:cs typeface="+mn-cs"/>
+                          <a:sym typeface="Arial"/>
+                        </a:rPr>
+                        <a:t>Companion AI</a:t>
+                      </a:r>
                     </a:p>
                   </a:txBody>
                   <a:tcPr>
@@ -13029,7 +13214,7 @@
                   </a:ext>
                 </a:extLst>
               </a:tr>
-              <a:tr h="1840706">
+              <a:tr h="1067060">
                 <a:tc>
                   <a:txBody>
                     <a:bodyPr/>
@@ -13099,9 +13284,45 @@
                     <a:bodyPr/>
                     <a:lstStyle/>
                     <a:p>
-                      <a:endParaRPr lang="en-US" dirty="0">
-                        <a:latin typeface="Graphik" panose="020B0503030202060203" pitchFamily="34" charset="0"/>
-                      </a:endParaRPr>
+                      <a:r>
+                        <a:rPr lang="en-US" sz="1867" b="0" i="0" u="none" strike="noStrike" cap="none" dirty="0">
+                          <a:solidFill>
+                            <a:schemeClr val="dk1"/>
+                          </a:solidFill>
+                          <a:effectLst/>
+                          <a:latin typeface="+mn-lt"/>
+                          <a:ea typeface="+mn-ea"/>
+                          <a:cs typeface="+mn-cs"/>
+                          <a:sym typeface="Arial"/>
+                        </a:rPr>
+                        <a:t>Develop an AI-driven multi-agent system to support elderly individuals with real-time monitoring, safety alerts, health management, daily reminders, and collaborative care </a:t>
+                      </a:r>
+                      <a:r>
+                        <a:rPr lang="en-US" sz="1800" b="0" i="0" u="none" strike="noStrike" cap="none" dirty="0">
+                          <a:solidFill>
+                            <a:schemeClr val="dk1"/>
+                          </a:solidFill>
+                          <a:effectLst/>
+                          <a:latin typeface="+mn-lt"/>
+                          <a:ea typeface="+mn-ea"/>
+                          <a:cs typeface="+mn-cs"/>
+                          <a:sym typeface="Arial"/>
+                        </a:rPr>
+                        <a:t>involving</a:t>
+                      </a:r>
+                      <a:r>
+                        <a:rPr lang="en-US" sz="1867" b="0" i="0" u="none" strike="noStrike" cap="none" dirty="0">
+                          <a:solidFill>
+                            <a:schemeClr val="dk1"/>
+                          </a:solidFill>
+                          <a:effectLst/>
+                          <a:latin typeface="+mn-lt"/>
+                          <a:ea typeface="+mn-ea"/>
+                          <a:cs typeface="+mn-cs"/>
+                          <a:sym typeface="Arial"/>
+                        </a:rPr>
+                        <a:t> family and professionals.</a:t>
+                      </a:r>
                     </a:p>
                   </a:txBody>
                   <a:tcPr>
@@ -13227,9 +13448,10 @@
                     <a:bodyPr/>
                     <a:lstStyle/>
                     <a:p>
-                      <a:endParaRPr lang="en-US" dirty="0">
-                        <a:latin typeface="Graphik" panose="020B0503030202060203" pitchFamily="34" charset="0"/>
-                      </a:endParaRPr>
+                      <a:r>
+                        <a:rPr lang="en-US" sz="1800" dirty="0"/>
+                        <a:t>Our proposed solution leverages multi-agent systems and large language models (LLMs) to monitor elderly individuals using data from various health sensors. The system analyzes real-time vitals and delivers detailed, actionable insights to doctors, caregivers, and family members. It offers personalized reminders tailored to the individual's routine—such as medication, appointments, and daily activities—and provides timely support in critical situations. Designed for minimal human intervention, the platform ensures consistent, automated care while promoting independence. Additionally, it generates comprehensive health summaries for medical professionals and allows individuals to track their daily health history, fostering proactive health management and peace of mind for all involved.</a:t>
+                      </a:r>
                     </a:p>
                   </a:txBody>
                   <a:tcPr>
@@ -13437,6 +13659,254 @@
               <a:ea typeface="Google Sans SemiBold"/>
               <a:cs typeface="Google Sans SemiBold"/>
               <a:sym typeface="Google Sans SemiBold"/>
+            </a:endParaRPr>
+          </a:p>
+        </p:txBody>
+      </p:sp>
+      <p:sp>
+        <p:nvSpPr>
+          <p:cNvPr id="4" name="TextBox 3">
+            <a:extLst>
+              <a:ext uri="{FF2B5EF4-FFF2-40B4-BE49-F238E27FC236}">
+                <a16:creationId xmlns:a16="http://schemas.microsoft.com/office/drawing/2014/main" id="{9ECF018D-3DE9-B299-D075-E772D7690F3D}"/>
+              </a:ext>
+            </a:extLst>
+          </p:cNvPr>
+          <p:cNvSpPr txBox="1"/>
+          <p:nvPr/>
+        </p:nvSpPr>
+        <p:spPr>
+          <a:xfrm>
+            <a:off x="323868" y="950808"/>
+            <a:ext cx="11868132" cy="5478423"/>
+          </a:xfrm>
+          <a:prstGeom prst="rect">
+            <a:avLst/>
+          </a:prstGeom>
+          <a:noFill/>
+        </p:spPr>
+        <p:txBody>
+          <a:bodyPr wrap="square">
+            <a:spAutoFit/>
+          </a:bodyPr>
+          <a:lstStyle/>
+          <a:p>
+            <a:r>
+              <a:rPr lang="en-US" sz="2000" b="1" dirty="0">
+                <a:solidFill>
+                  <a:srgbClr val="A100FF"/>
+                </a:solidFill>
+                <a:latin typeface="Graphik"/>
+              </a:rPr>
+              <a:t>Challenge Overview:</a:t>
+            </a:r>
+            <a:endParaRPr lang="en-US" sz="2000" dirty="0">
+              <a:solidFill>
+                <a:srgbClr val="000000"/>
+              </a:solidFill>
+              <a:latin typeface="Graphik"/>
+            </a:endParaRPr>
+          </a:p>
+          <a:p>
+            <a:r>
+              <a:rPr lang="en-US" sz="1800" dirty="0">
+                <a:solidFill>
+                  <a:srgbClr val="000000"/>
+                </a:solidFill>
+                <a:latin typeface="Graphik"/>
+              </a:rPr>
+              <a:t>As the global population ages, ensuring the well-being of elderly individuals living independently presents a major challenge. </a:t>
+            </a:r>
+          </a:p>
+          <a:p>
+            <a:r>
+              <a:rPr lang="en-US" sz="1800" dirty="0">
+                <a:solidFill>
+                  <a:srgbClr val="000000"/>
+                </a:solidFill>
+                <a:latin typeface="Graphik"/>
+              </a:rPr>
+              <a:t>The goal of this hackathon is to develop a multi-agentic AI system that assists elderly individuals by providing real-time monitoring, reminders, and safety alerts, while promoting health management and social engagement. The agents will work together to create a collaborative support system, involving caregivers, healthcare providers, and family members to ensure optimal care and peace of mind.</a:t>
+            </a:r>
+            <a:endParaRPr lang="en-US" sz="1800" dirty="0">
+              <a:solidFill>
+                <a:srgbClr val="000000"/>
+              </a:solidFill>
+              <a:latin typeface="Graphik" panose="020B0503030202060203" pitchFamily="34" charset="0"/>
+            </a:endParaRPr>
+          </a:p>
+          <a:p>
+            <a:r>
+              <a:rPr lang="en-US" sz="1800" dirty="0">
+                <a:solidFill>
+                  <a:srgbClr val="000000"/>
+                </a:solidFill>
+                <a:latin typeface="Graphik"/>
+              </a:rPr>
+              <a:t>The system should monitor health, detect unusual behavior, and provide alerts in case of emergencies. It should also provide reminders to manage daily routines, such as medication schedules, appointments, and daily activities. </a:t>
+            </a:r>
+            <a:endParaRPr lang="en-US" sz="2000" dirty="0">
+              <a:solidFill>
+                <a:srgbClr val="000000"/>
+              </a:solidFill>
+              <a:latin typeface="Graphik" panose="020B0503030202060203" pitchFamily="34" charset="0"/>
+            </a:endParaRPr>
+          </a:p>
+          <a:p>
+            <a:pPr algn="l"/>
+            <a:endParaRPr lang="en-US" sz="2000" b="1" dirty="0">
+              <a:solidFill>
+                <a:srgbClr val="A100FF"/>
+              </a:solidFill>
+              <a:latin typeface="Graphik"/>
+            </a:endParaRPr>
+          </a:p>
+          <a:p>
+            <a:pPr algn="l"/>
+            <a:r>
+              <a:rPr lang="en-US" sz="2000" b="1" dirty="0">
+                <a:solidFill>
+                  <a:srgbClr val="A100FF"/>
+                </a:solidFill>
+                <a:latin typeface="Graphik"/>
+              </a:rPr>
+              <a:t>Current Process:</a:t>
+            </a:r>
+            <a:endParaRPr lang="en-US" sz="2000" dirty="0">
+              <a:solidFill>
+                <a:srgbClr val="000000"/>
+              </a:solidFill>
+              <a:latin typeface="Graphik"/>
+            </a:endParaRPr>
+          </a:p>
+          <a:p>
+            <a:pPr marL="285750" indent="-285750" algn="l">
+              <a:buFont typeface="Arial,Sans-Serif"/>
+              <a:buChar char="•"/>
+            </a:pPr>
+            <a:r>
+              <a:rPr lang="en-US" sz="1800" b="1" dirty="0">
+                <a:solidFill>
+                  <a:srgbClr val="000000"/>
+                </a:solidFill>
+                <a:latin typeface="Graphik"/>
+              </a:rPr>
+              <a:t>ADAS system</a:t>
+            </a:r>
+            <a:r>
+              <a:rPr lang="en-US" sz="1800" dirty="0">
+                <a:solidFill>
+                  <a:srgbClr val="000000"/>
+                </a:solidFill>
+                <a:latin typeface="Graphik"/>
+              </a:rPr>
+              <a:t>: Collects and Monitors driving data (e.g., sensor data, environment data) and gets alerted if abnormal values are detected.</a:t>
+            </a:r>
+            <a:endParaRPr lang="en-US" sz="1800" dirty="0">
+              <a:solidFill>
+                <a:srgbClr val="000000"/>
+              </a:solidFill>
+              <a:latin typeface="Graphik" panose="020B0503030202060203" pitchFamily="34" charset="0"/>
+            </a:endParaRPr>
+          </a:p>
+          <a:p>
+            <a:pPr marL="285750" indent="-285750" algn="l">
+              <a:buFont typeface="Arial,Sans-Serif"/>
+              <a:buChar char="•"/>
+            </a:pPr>
+            <a:r>
+              <a:rPr lang="en-US" sz="1800" b="1" dirty="0">
+                <a:solidFill>
+                  <a:srgbClr val="000000"/>
+                </a:solidFill>
+                <a:latin typeface="Graphik"/>
+              </a:rPr>
+              <a:t>Safety Monitoring System</a:t>
+            </a:r>
+            <a:r>
+              <a:rPr lang="en-US" sz="1800" dirty="0">
+                <a:solidFill>
+                  <a:srgbClr val="000000"/>
+                </a:solidFill>
+                <a:latin typeface="Graphik"/>
+              </a:rPr>
+              <a:t>: Uses sensor data and detects anomalies in the sensor data maybe due to environment, physical of cyber attacks which created the anomalies</a:t>
+            </a:r>
+            <a:endParaRPr lang="en-US" sz="1800" dirty="0">
+              <a:solidFill>
+                <a:srgbClr val="000000"/>
+              </a:solidFill>
+              <a:latin typeface="Graphik" panose="020B0503030202060203" pitchFamily="34" charset="0"/>
+            </a:endParaRPr>
+          </a:p>
+          <a:p>
+            <a:pPr marL="285750" indent="-285750">
+              <a:buFont typeface="Arial,Sans-Serif"/>
+              <a:buChar char="•"/>
+            </a:pPr>
+            <a:r>
+              <a:rPr lang="en-US" sz="1800" b="1" dirty="0">
+                <a:solidFill>
+                  <a:srgbClr val="000000"/>
+                </a:solidFill>
+                <a:latin typeface="Graphik"/>
+              </a:rPr>
+              <a:t>Scheduled maintenance System</a:t>
+            </a:r>
+            <a:r>
+              <a:rPr lang="en-US" sz="1800" dirty="0">
+                <a:solidFill>
+                  <a:srgbClr val="000000"/>
+                </a:solidFill>
+                <a:latin typeface="Graphik"/>
+              </a:rPr>
+              <a:t>: Provides scheduled maintenance of the vehicle and informs the concerned on such anomalies be it commercial or passenger vehicle(cars/trucks)</a:t>
+            </a:r>
+          </a:p>
+          <a:p>
+            <a:pPr marL="285750" indent="-285750">
+              <a:buFont typeface="Arial,Sans-Serif"/>
+              <a:buChar char="•"/>
+            </a:pPr>
+            <a:endParaRPr lang="en-US" sz="1800" dirty="0">
+              <a:solidFill>
+                <a:srgbClr val="000000"/>
+              </a:solidFill>
+              <a:latin typeface="Graphik"/>
+            </a:endParaRPr>
+          </a:p>
+          <a:p>
+            <a:endParaRPr lang="en-US" sz="1800" dirty="0">
+              <a:solidFill>
+                <a:srgbClr val="000000"/>
+              </a:solidFill>
+              <a:latin typeface="Graphik"/>
+            </a:endParaRPr>
+          </a:p>
+          <a:p>
+            <a:r>
+              <a:rPr lang="en-US" sz="2000" b="1" dirty="0">
+                <a:solidFill>
+                  <a:srgbClr val="A100FF"/>
+                </a:solidFill>
+                <a:latin typeface="Graphik"/>
+              </a:rPr>
+              <a:t>Expected Technical Output: </a:t>
+            </a:r>
+            <a:r>
+              <a:rPr lang="en-US" sz="1800" dirty="0">
+                <a:solidFill>
+                  <a:srgbClr val="000000"/>
+                </a:solidFill>
+                <a:latin typeface="Graphik"/>
+              </a:rPr>
+              <a:t>Multiagent framework</a:t>
+            </a:r>
+            <a:endParaRPr lang="en-US" sz="2000" b="1" dirty="0">
+              <a:solidFill>
+                <a:srgbClr val="A100FF"/>
+              </a:solidFill>
+              <a:latin typeface="Graphik" panose="020B0503030202060203" pitchFamily="34" charset="0"/>
             </a:endParaRPr>
           </a:p>
         </p:txBody>
@@ -14923,6 +15393,7 @@
 
 <file path=docMetadata/LabelInfo.xml><?xml version="1.0" encoding="utf-8"?>
 <clbl:labelList xmlns:clbl="http://schemas.microsoft.com/office/2020/mipLabelMetadata">
+  <clbl:label id="{6006a9c5-d130-408c-bc8e-3b5ecdb17aa0}" enabled="1" method="Standard" siteId="{8d4b558f-7b2e-40ba-ad1f-e04d79e6265a}" contentBits="2" removed="0"/>
   <clbl:label id="{e0793d39-0939-496d-b129-198edd916feb}" enabled="0" method="" siteId="{e0793d39-0939-496d-b129-198edd916feb}" removed="1"/>
 </clbl:labelList>
 </file>
</xml_diff>